<commit_message>
Added documentation for Chirp transformations Competely removed the stats members from Chirp and MChirp classes, as they are not being used.
</commit_message>
<xml_diff>
--- a/docs/_images/ChiptuneSAK.pptx
+++ b/docs/_images/ChiptuneSAK.pptx
@@ -4692,8 +4692,8 @@
         </p:nvSpPr>
         <p:spPr>
           <a:xfrm>
-            <a:off x="685800" y="1752600"/>
-            <a:ext cx="7772400" cy="3352800"/>
+            <a:off x="685800" y="2121932"/>
+            <a:ext cx="7772400" cy="2983468"/>
           </a:xfrm>
           <a:prstGeom prst="rect">
             <a:avLst/>
@@ -4744,7 +4744,7 @@
         </p:nvSpPr>
         <p:spPr>
           <a:xfrm>
-            <a:off x="3886200" y="1905000"/>
+            <a:off x="3886200" y="2133600"/>
             <a:ext cx="1143262" cy="369332"/>
           </a:xfrm>
           <a:prstGeom prst="rect">
@@ -4864,7 +4864,7 @@
         </p:nvSpPr>
         <p:spPr>
           <a:xfrm>
-            <a:off x="3953119" y="2362200"/>
+            <a:off x="3977349" y="2435423"/>
             <a:ext cx="897425" cy="307777"/>
           </a:xfrm>
           <a:prstGeom prst="rect">

</xml_diff>